<commit_message>
Formatting, remove other people's code
</commit_message>
<xml_diff>
--- a/units/1/lessons/3/resources/petascale-lesson-1.3-slides.pptx
+++ b/units/1/lessons/3/resources/petascale-lesson-1.3-slides.pptx
@@ -208,7 +208,7 @@
           <a:p>
             <a:fld id="{2B504B78-1614-49D9-BD52-41DBB9B24231}" type="datetimeFigureOut">
               <a:rPr lang="en-US" smtClean="0"/>
-              <a:t>10/11/20</a:t>
+              <a:t>11/16/20</a:t>
             </a:fld>
             <a:endParaRPr lang="en-US"/>
           </a:p>
@@ -9268,7 +9268,7 @@
           <a:p>
             <a:fld id="{6AD6EE87-EBD5-4F12-A48A-63ACA297AC8F}" type="datetimeFigureOut">
               <a:rPr lang="en-US" dirty="0"/>
-              <a:t>10/11/20</a:t>
+              <a:t>11/16/20</a:t>
             </a:fld>
             <a:endParaRPr lang="en-US" dirty="0"/>
           </a:p>
@@ -9470,7 +9470,7 @@
           <a:p>
             <a:fld id="{4CD73815-2707-4475-8F1A-B873CB631BB4}" type="datetimeFigureOut">
               <a:rPr lang="en-US" dirty="0"/>
-              <a:t>10/11/20</a:t>
+              <a:t>11/16/20</a:t>
             </a:fld>
             <a:endParaRPr lang="en-US" dirty="0"/>
           </a:p>
@@ -9645,7 +9645,7 @@
           <a:p>
             <a:fld id="{2A4AFB99-0EAB-4182-AFF8-E214C82A68F6}" type="datetimeFigureOut">
               <a:rPr lang="en-US" dirty="0"/>
-              <a:t>10/11/20</a:t>
+              <a:t>11/16/20</a:t>
             </a:fld>
             <a:endParaRPr lang="en-US" dirty="0"/>
           </a:p>
@@ -9874,7 +9874,7 @@
                 </a:solidFill>
               </a:rPr>
               <a:pPr/>
-              <a:t>10/11/20</a:t>
+              <a:t>11/16/20</a:t>
             </a:fld>
             <a:endParaRPr lang="en-US">
               <a:solidFill>
@@ -10072,7 +10072,7 @@
                 </a:solidFill>
               </a:rPr>
               <a:pPr/>
-              <a:t>10/11/20</a:t>
+              <a:t>11/16/20</a:t>
             </a:fld>
             <a:endParaRPr lang="en-US">
               <a:solidFill>
@@ -10346,7 +10346,7 @@
                 </a:solidFill>
               </a:rPr>
               <a:pPr/>
-              <a:t>10/11/20</a:t>
+              <a:t>11/16/20</a:t>
             </a:fld>
             <a:endParaRPr lang="en-US">
               <a:solidFill>
@@ -10606,7 +10606,7 @@
                 </a:solidFill>
               </a:rPr>
               <a:pPr/>
-              <a:t>10/11/20</a:t>
+              <a:t>11/16/20</a:t>
             </a:fld>
             <a:endParaRPr lang="en-US">
               <a:solidFill>
@@ -11001,7 +11001,7 @@
                 </a:solidFill>
               </a:rPr>
               <a:pPr/>
-              <a:t>10/11/20</a:t>
+              <a:t>11/16/20</a:t>
             </a:fld>
             <a:endParaRPr lang="en-US">
               <a:solidFill>
@@ -11147,7 +11147,7 @@
                 </a:solidFill>
               </a:rPr>
               <a:pPr/>
-              <a:t>10/11/20</a:t>
+              <a:t>11/16/20</a:t>
             </a:fld>
             <a:endParaRPr lang="en-US">
               <a:solidFill>
@@ -11270,7 +11270,7 @@
                 </a:solidFill>
               </a:rPr>
               <a:pPr/>
-              <a:t>10/11/20</a:t>
+              <a:t>11/16/20</a:t>
             </a:fld>
             <a:endParaRPr lang="en-US">
               <a:solidFill>
@@ -11575,7 +11575,7 @@
                 </a:solidFill>
               </a:rPr>
               <a:pPr/>
-              <a:t>10/11/20</a:t>
+              <a:t>11/16/20</a:t>
             </a:fld>
             <a:endParaRPr lang="en-US">
               <a:solidFill>
@@ -11766,7 +11766,7 @@
           <a:p>
             <a:fld id="{A5D3794B-289A-4A80-97D7-111025398D45}" type="datetimeFigureOut">
               <a:rPr lang="en-US" dirty="0"/>
-              <a:t>10/11/20</a:t>
+              <a:t>11/16/20</a:t>
             </a:fld>
             <a:endParaRPr lang="en-US" dirty="0"/>
           </a:p>
@@ -12021,7 +12021,7 @@
                 </a:solidFill>
               </a:rPr>
               <a:pPr/>
-              <a:t>10/11/20</a:t>
+              <a:t>11/16/20</a:t>
             </a:fld>
             <a:endParaRPr lang="en-US">
               <a:solidFill>
@@ -12219,7 +12219,7 @@
                 </a:solidFill>
               </a:rPr>
               <a:pPr/>
-              <a:t>10/11/20</a:t>
+              <a:t>11/16/20</a:t>
             </a:fld>
             <a:endParaRPr lang="en-US">
               <a:solidFill>
@@ -12427,7 +12427,7 @@
                 </a:solidFill>
               </a:rPr>
               <a:pPr/>
-              <a:t>10/11/20</a:t>
+              <a:t>11/16/20</a:t>
             </a:fld>
             <a:endParaRPr lang="en-US">
               <a:solidFill>
@@ -21346,7 +21346,7 @@
           <a:p>
             <a:fld id="{5A61015F-7CC6-4D0A-9D87-873EA4C304CC}" type="datetimeFigureOut">
               <a:rPr lang="en-US" dirty="0"/>
-              <a:t>10/11/20</a:t>
+              <a:t>11/16/20</a:t>
             </a:fld>
             <a:endParaRPr lang="en-US" dirty="0"/>
           </a:p>
@@ -21615,7 +21615,7 @@
           <a:p>
             <a:fld id="{93C6A301-0538-44EC-B09D-202E1042A48B}" type="datetimeFigureOut">
               <a:rPr lang="en-US" dirty="0"/>
-              <a:t>10/11/20</a:t>
+              <a:t>11/16/20</a:t>
             </a:fld>
             <a:endParaRPr lang="en-US" dirty="0"/>
           </a:p>
@@ -22008,7 +22008,7 @@
           <a:p>
             <a:fld id="{D789574A-8875-45EF-8EA2-3CAA0F7ABC4C}" type="datetimeFigureOut">
               <a:rPr lang="en-US" dirty="0"/>
-              <a:t>10/11/20</a:t>
+              <a:t>11/16/20</a:t>
             </a:fld>
             <a:endParaRPr lang="en-US" dirty="0"/>
           </a:p>
@@ -22121,7 +22121,7 @@
           <a:p>
             <a:fld id="{67EF4D4C-5367-4C26-9E2B-D8088D7FCA81}" type="datetimeFigureOut">
               <a:rPr lang="en-US" dirty="0"/>
-              <a:t>10/11/20</a:t>
+              <a:t>11/16/20</a:t>
             </a:fld>
             <a:endParaRPr lang="en-US" dirty="0"/>
           </a:p>
@@ -22211,7 +22211,7 @@
           <a:p>
             <a:fld id="{56E91E96-98B0-4413-9547-46F3504108EF}" type="datetimeFigureOut">
               <a:rPr lang="en-US" dirty="0"/>
-              <a:t>10/11/20</a:t>
+              <a:t>11/16/20</a:t>
             </a:fld>
             <a:endParaRPr lang="en-US" dirty="0"/>
           </a:p>
@@ -22496,7 +22496,7 @@
           <a:p>
             <a:fld id="{05C68B11-C5A8-448C-8CE9-B1A273C79CFC}" type="datetimeFigureOut">
               <a:rPr lang="en-US" dirty="0"/>
-              <a:t>10/11/20</a:t>
+              <a:t>11/16/20</a:t>
             </a:fld>
             <a:endParaRPr lang="en-US" dirty="0"/>
           </a:p>
@@ -22771,7 +22771,7 @@
           <a:p>
             <a:fld id="{C7616CA0-919D-4A49-9C8A-62FDFB3A5183}" type="datetimeFigureOut">
               <a:rPr lang="en-US" dirty="0"/>
-              <a:t>10/11/20</a:t>
+              <a:t>11/16/20</a:t>
             </a:fld>
             <a:endParaRPr lang="en-US" dirty="0"/>
           </a:p>
@@ -23017,7 +23017,7 @@
             <a:fld id="{90298CD5-6C1E-4009-B41F-6DF62E31D3BE}" type="datetimeFigureOut">
               <a:rPr lang="en-US" dirty="0"/>
               <a:pPr/>
-              <a:t>10/11/20</a:t>
+              <a:t>11/16/20</a:t>
             </a:fld>
             <a:endParaRPr lang="en-US" dirty="0"/>
           </a:p>
@@ -23658,7 +23658,7 @@
                 </a:solidFill>
               </a:rPr>
               <a:pPr defTabSz="914400"/>
-              <a:t>10/11/20</a:t>
+              <a:t>11/16/20</a:t>
             </a:fld>
             <a:endParaRPr lang="en-US">
               <a:solidFill>
@@ -24292,7 +24292,7 @@
           <p:cNvPr id="2" name="Title 1">
             <a:extLst>
               <a:ext uri="{FF2B5EF4-FFF2-40B4-BE49-F238E27FC236}">
-                <a16:creationId xmlns="" xmlns:a16="http://schemas.microsoft.com/office/drawing/2014/main" id="{2AB034E0-008F-43F5-8BAB-A81D72627EF6}"/>
+                <a16:creationId xmlns:a16="http://schemas.microsoft.com/office/drawing/2014/main" xmlns="" id="{2AB034E0-008F-43F5-8BAB-A81D72627EF6}"/>
               </a:ext>
             </a:extLst>
           </p:cNvPr>
@@ -24320,7 +24320,7 @@
           <p:cNvPr id="3" name="Graphic 2" descr="Computer">
             <a:extLst>
               <a:ext uri="{FF2B5EF4-FFF2-40B4-BE49-F238E27FC236}">
-                <a16:creationId xmlns="" xmlns:a16="http://schemas.microsoft.com/office/drawing/2014/main" id="{23974D4D-04B4-4BB3-A6AD-05B84EFB64BD}"/>
+                <a16:creationId xmlns:a16="http://schemas.microsoft.com/office/drawing/2014/main" xmlns="" id="{23974D4D-04B4-4BB3-A6AD-05B84EFB64BD}"/>
               </a:ext>
             </a:extLst>
           </p:cNvPr>
@@ -24333,7 +24333,7 @@
           <a:blip r:embed="rId2">
             <a:extLst>
               <a:ext uri="{96DAC541-7B7A-43D3-8B79-37D633B846F1}">
-                <asvg:svgBlip xmlns="" xmlns:asvg="http://schemas.microsoft.com/office/drawing/2016/SVG/main" r:embed="rId3"/>
+                <asvg:svgBlip xmlns:asvg="http://schemas.microsoft.com/office/drawing/2016/SVG/main" xmlns="" r:embed="rId3"/>
               </a:ext>
             </a:extLst>
           </a:blip>
@@ -24356,7 +24356,7 @@
           <p:cNvPr id="4" name="Graphic 3" descr="Server">
             <a:extLst>
               <a:ext uri="{FF2B5EF4-FFF2-40B4-BE49-F238E27FC236}">
-                <a16:creationId xmlns="" xmlns:a16="http://schemas.microsoft.com/office/drawing/2014/main" id="{1FDFC814-4A84-44C6-A12A-172B1F8BEF85}"/>
+                <a16:creationId xmlns:a16="http://schemas.microsoft.com/office/drawing/2014/main" xmlns="" id="{1FDFC814-4A84-44C6-A12A-172B1F8BEF85}"/>
               </a:ext>
             </a:extLst>
           </p:cNvPr>
@@ -24369,7 +24369,7 @@
           <a:blip r:embed="rId4">
             <a:extLst>
               <a:ext uri="{96DAC541-7B7A-43D3-8B79-37D633B846F1}">
-                <asvg:svgBlip xmlns="" xmlns:asvg="http://schemas.microsoft.com/office/drawing/2016/SVG/main" r:embed="rId5"/>
+                <asvg:svgBlip xmlns:asvg="http://schemas.microsoft.com/office/drawing/2016/SVG/main" xmlns="" r:embed="rId5"/>
               </a:ext>
             </a:extLst>
           </a:blip>
@@ -24392,7 +24392,7 @@
           <p:cNvPr id="9" name="Graphic 8" descr="Server">
             <a:extLst>
               <a:ext uri="{FF2B5EF4-FFF2-40B4-BE49-F238E27FC236}">
-                <a16:creationId xmlns="" xmlns:a16="http://schemas.microsoft.com/office/drawing/2014/main" id="{9D329C38-0021-4158-A073-553E44F02ECB}"/>
+                <a16:creationId xmlns:a16="http://schemas.microsoft.com/office/drawing/2014/main" xmlns="" id="{9D329C38-0021-4158-A073-553E44F02ECB}"/>
               </a:ext>
             </a:extLst>
           </p:cNvPr>
@@ -24405,7 +24405,7 @@
           <a:blip r:embed="rId6">
             <a:extLst>
               <a:ext uri="{96DAC541-7B7A-43D3-8B79-37D633B846F1}">
-                <asvg:svgBlip xmlns="" xmlns:asvg="http://schemas.microsoft.com/office/drawing/2016/SVG/main" r:embed="rId7"/>
+                <asvg:svgBlip xmlns:asvg="http://schemas.microsoft.com/office/drawing/2016/SVG/main" xmlns="" r:embed="rId7"/>
               </a:ext>
             </a:extLst>
           </a:blip>
@@ -24428,7 +24428,7 @@
           <p:cNvPr id="17" name="Graphic 16" descr="Server">
             <a:extLst>
               <a:ext uri="{FF2B5EF4-FFF2-40B4-BE49-F238E27FC236}">
-                <a16:creationId xmlns="" xmlns:a16="http://schemas.microsoft.com/office/drawing/2014/main" id="{82B78643-627A-4B27-B82B-4DFFB81462F4}"/>
+                <a16:creationId xmlns:a16="http://schemas.microsoft.com/office/drawing/2014/main" xmlns="" id="{82B78643-627A-4B27-B82B-4DFFB81462F4}"/>
               </a:ext>
             </a:extLst>
           </p:cNvPr>
@@ -24441,7 +24441,7 @@
           <a:blip r:embed="rId6">
             <a:extLst>
               <a:ext uri="{96DAC541-7B7A-43D3-8B79-37D633B846F1}">
-                <asvg:svgBlip xmlns="" xmlns:asvg="http://schemas.microsoft.com/office/drawing/2016/SVG/main" r:embed="rId7"/>
+                <asvg:svgBlip xmlns:asvg="http://schemas.microsoft.com/office/drawing/2016/SVG/main" xmlns="" r:embed="rId7"/>
               </a:ext>
             </a:extLst>
           </a:blip>
@@ -24464,7 +24464,7 @@
           <p:cNvPr id="19" name="Graphic 18" descr="Server">
             <a:extLst>
               <a:ext uri="{FF2B5EF4-FFF2-40B4-BE49-F238E27FC236}">
-                <a16:creationId xmlns="" xmlns:a16="http://schemas.microsoft.com/office/drawing/2014/main" id="{DB5AEF96-932A-4024-85E8-20825E817DD7}"/>
+                <a16:creationId xmlns:a16="http://schemas.microsoft.com/office/drawing/2014/main" xmlns="" id="{DB5AEF96-932A-4024-85E8-20825E817DD7}"/>
               </a:ext>
             </a:extLst>
           </p:cNvPr>
@@ -24477,7 +24477,7 @@
           <a:blip r:embed="rId6">
             <a:extLst>
               <a:ext uri="{96DAC541-7B7A-43D3-8B79-37D633B846F1}">
-                <asvg:svgBlip xmlns="" xmlns:asvg="http://schemas.microsoft.com/office/drawing/2016/SVG/main" r:embed="rId7"/>
+                <asvg:svgBlip xmlns:asvg="http://schemas.microsoft.com/office/drawing/2016/SVG/main" xmlns="" r:embed="rId7"/>
               </a:ext>
             </a:extLst>
           </a:blip>
@@ -24500,7 +24500,7 @@
           <p:cNvPr id="21" name="Straight Arrow Connector 20">
             <a:extLst>
               <a:ext uri="{FF2B5EF4-FFF2-40B4-BE49-F238E27FC236}">
-                <a16:creationId xmlns="" xmlns:a16="http://schemas.microsoft.com/office/drawing/2014/main" id="{77B5BEE7-4921-43C3-9884-9B6EC42B05EE}"/>
+                <a16:creationId xmlns:a16="http://schemas.microsoft.com/office/drawing/2014/main" xmlns="" id="{77B5BEE7-4921-43C3-9884-9B6EC42B05EE}"/>
               </a:ext>
             </a:extLst>
           </p:cNvPr>
@@ -24542,7 +24542,7 @@
           <p:cNvPr id="25" name="Straight Connector 24">
             <a:extLst>
               <a:ext uri="{FF2B5EF4-FFF2-40B4-BE49-F238E27FC236}">
-                <a16:creationId xmlns="" xmlns:a16="http://schemas.microsoft.com/office/drawing/2014/main" id="{73DE03B1-CC3F-4E26-81F0-81BE00F34104}"/>
+                <a16:creationId xmlns:a16="http://schemas.microsoft.com/office/drawing/2014/main" xmlns="" id="{73DE03B1-CC3F-4E26-81F0-81BE00F34104}"/>
               </a:ext>
             </a:extLst>
           </p:cNvPr>
@@ -24581,7 +24581,7 @@
           <p:cNvPr id="26" name="TextBox 25">
             <a:extLst>
               <a:ext uri="{FF2B5EF4-FFF2-40B4-BE49-F238E27FC236}">
-                <a16:creationId xmlns="" xmlns:a16="http://schemas.microsoft.com/office/drawing/2014/main" id="{16CE1363-D2AE-4275-A9D2-2FB0D1EB317F}"/>
+                <a16:creationId xmlns:a16="http://schemas.microsoft.com/office/drawing/2014/main" xmlns="" id="{16CE1363-D2AE-4275-A9D2-2FB0D1EB317F}"/>
               </a:ext>
             </a:extLst>
           </p:cNvPr>
@@ -24616,7 +24616,7 @@
           <p:cNvPr id="28" name="TextBox 27">
             <a:extLst>
               <a:ext uri="{FF2B5EF4-FFF2-40B4-BE49-F238E27FC236}">
-                <a16:creationId xmlns="" xmlns:a16="http://schemas.microsoft.com/office/drawing/2014/main" id="{4E106387-801B-4B84-8DE2-D5D0C9E2D146}"/>
+                <a16:creationId xmlns:a16="http://schemas.microsoft.com/office/drawing/2014/main" xmlns="" id="{4E106387-801B-4B84-8DE2-D5D0C9E2D146}"/>
               </a:ext>
             </a:extLst>
           </p:cNvPr>
@@ -24651,7 +24651,7 @@
           <p:cNvPr id="30" name="TextBox 29">
             <a:extLst>
               <a:ext uri="{FF2B5EF4-FFF2-40B4-BE49-F238E27FC236}">
-                <a16:creationId xmlns="" xmlns:a16="http://schemas.microsoft.com/office/drawing/2014/main" id="{D70ADCC6-62AE-4E66-B896-686588015D67}"/>
+                <a16:creationId xmlns:a16="http://schemas.microsoft.com/office/drawing/2014/main" xmlns="" id="{D70ADCC6-62AE-4E66-B896-686588015D67}"/>
               </a:ext>
             </a:extLst>
           </p:cNvPr>
@@ -24686,7 +24686,7 @@
           <p:cNvPr id="31" name="TextBox 30">
             <a:extLst>
               <a:ext uri="{FF2B5EF4-FFF2-40B4-BE49-F238E27FC236}">
-                <a16:creationId xmlns="" xmlns:a16="http://schemas.microsoft.com/office/drawing/2014/main" id="{6D43CEEC-3E75-4A50-B80E-6721D5B99DEC}"/>
+                <a16:creationId xmlns:a16="http://schemas.microsoft.com/office/drawing/2014/main" xmlns="" id="{6D43CEEC-3E75-4A50-B80E-6721D5B99DEC}"/>
               </a:ext>
             </a:extLst>
           </p:cNvPr>
@@ -24729,7 +24729,7 @@
           <p:cNvPr id="32" name="Picture 31">
             <a:extLst>
               <a:ext uri="{FF2B5EF4-FFF2-40B4-BE49-F238E27FC236}">
-                <a16:creationId xmlns="" xmlns:a16="http://schemas.microsoft.com/office/drawing/2014/main" id="{0A28CED3-D298-463D-8A0A-1BD9FCBC3B28}"/>
+                <a16:creationId xmlns:a16="http://schemas.microsoft.com/office/drawing/2014/main" xmlns="" id="{0A28CED3-D298-463D-8A0A-1BD9FCBC3B28}"/>
               </a:ext>
             </a:extLst>
           </p:cNvPr>
@@ -24759,7 +24759,7 @@
           <p:cNvPr id="34" name="Rectangle 33">
             <a:extLst>
               <a:ext uri="{FF2B5EF4-FFF2-40B4-BE49-F238E27FC236}">
-                <a16:creationId xmlns="" xmlns:a16="http://schemas.microsoft.com/office/drawing/2014/main" id="{1F2DC80C-67E9-49A0-9E9D-7911B38F35CC}"/>
+                <a16:creationId xmlns:a16="http://schemas.microsoft.com/office/drawing/2014/main" xmlns="" id="{1F2DC80C-67E9-49A0-9E9D-7911B38F35CC}"/>
               </a:ext>
             </a:extLst>
           </p:cNvPr>
@@ -24853,10 +24853,10 @@
           <p:cNvPr id="8" name="Rectangle 7">
             <a:extLst>
               <a:ext uri="{FF2B5EF4-FFF2-40B4-BE49-F238E27FC236}">
-                <a16:creationId xmlns="" xmlns:a16="http://schemas.microsoft.com/office/drawing/2014/main" id="{F9B8E572-2CE6-4185-BC38-989024BC010D}"/>
+                <a16:creationId xmlns:a16="http://schemas.microsoft.com/office/drawing/2014/main" xmlns="" id="{F9B8E572-2CE6-4185-BC38-989024BC010D}"/>
               </a:ext>
               <a:ext uri="{C183D7F6-B498-43B3-948B-1728B52AA6E4}">
-                <adec:decorative xmlns="" xmlns:adec="http://schemas.microsoft.com/office/drawing/2017/decorative" val="1"/>
+                <adec:decorative xmlns:adec="http://schemas.microsoft.com/office/drawing/2017/decorative" xmlns="" val="1"/>
               </a:ext>
             </a:extLst>
           </p:cNvPr>
@@ -24913,7 +24913,7 @@
           <p:cNvPr id="2" name="Title 1">
             <a:extLst>
               <a:ext uri="{FF2B5EF4-FFF2-40B4-BE49-F238E27FC236}">
-                <a16:creationId xmlns="" xmlns:a16="http://schemas.microsoft.com/office/drawing/2014/main" id="{883D1961-8703-4143-A50A-A9D891D8FC52}"/>
+                <a16:creationId xmlns:a16="http://schemas.microsoft.com/office/drawing/2014/main" xmlns="" id="{883D1961-8703-4143-A50A-A9D891D8FC52}"/>
               </a:ext>
             </a:extLst>
           </p:cNvPr>
@@ -24948,10 +24948,10 @@
           <p:cNvPr id="10" name="Straight Connector 9">
             <a:extLst>
               <a:ext uri="{FF2B5EF4-FFF2-40B4-BE49-F238E27FC236}">
-                <a16:creationId xmlns="" xmlns:a16="http://schemas.microsoft.com/office/drawing/2014/main" id="{75415567-45D9-4FB5-B020-6FAD77889407}"/>
+                <a16:creationId xmlns:a16="http://schemas.microsoft.com/office/drawing/2014/main" xmlns="" id="{75415567-45D9-4FB5-B020-6FAD77889407}"/>
               </a:ext>
               <a:ext uri="{C183D7F6-B498-43B3-948B-1728B52AA6E4}">
-                <adec:decorative xmlns="" xmlns:adec="http://schemas.microsoft.com/office/drawing/2017/decorative" val="1"/>
+                <adec:decorative xmlns:adec="http://schemas.microsoft.com/office/drawing/2017/decorative" xmlns="" val="1"/>
               </a:ext>
             </a:extLst>
           </p:cNvPr>
@@ -25000,7 +25000,7 @@
           <p:cNvPr id="3" name="Content Placeholder 2">
             <a:extLst>
               <a:ext uri="{FF2B5EF4-FFF2-40B4-BE49-F238E27FC236}">
-                <a16:creationId xmlns="" xmlns:a16="http://schemas.microsoft.com/office/drawing/2014/main" id="{CFF4E226-9212-4F40-9BBF-9B120E901A18}"/>
+                <a16:creationId xmlns:a16="http://schemas.microsoft.com/office/drawing/2014/main" xmlns="" id="{CFF4E226-9212-4F40-9BBF-9B120E901A18}"/>
               </a:ext>
             </a:extLst>
           </p:cNvPr>
@@ -25025,22 +25025,28 @@
           <a:p>
             <a:pPr lvl="1"/>
             <a:r>
-              <a:rPr lang="en-US" dirty="0">
-                <a:hlinkClick r:id="rId2"/>
-              </a:rPr>
+              <a:rPr lang="en-US" dirty="0"/>
               <a:t>man </a:t>
             </a:r>
             <a:r>
-              <a:rPr lang="en-US" dirty="0" err="1">
+              <a:rPr lang="en-US" dirty="0" err="1" smtClean="0"/>
+              <a:t>scp</a:t>
+            </a:r>
+            <a:r>
+              <a:rPr lang="en-US" dirty="0" smtClean="0"/>
+              <a:t>: </a:t>
+            </a:r>
+            <a:r>
+              <a:rPr lang="en-US" dirty="0" smtClean="0">
                 <a:hlinkClick r:id="rId2"/>
               </a:rPr>
-              <a:t>scp</a:t>
+              <a:t>https</a:t>
             </a:r>
             <a:r>
               <a:rPr lang="en-US" dirty="0">
                 <a:hlinkClick r:id="rId2"/>
               </a:rPr>
-              <a:t>: https://man7.org/linux/man-pages/man1/scp.1.html</a:t>
+              <a:t>://man7.org/linux/man-pages/man1/scp.1.html</a:t>
             </a:r>
             <a:endParaRPr lang="en-US" dirty="0"/>
           </a:p>
@@ -25287,23 +25293,7 @@
                 <a:ea typeface="Times New Roman" charset="0"/>
                 <a:cs typeface="Times New Roman" charset="0"/>
               </a:rPr>
-              <a:t>CC </a:t>
-            </a:r>
-            <a:r>
-              <a:rPr lang="en-US" sz="2800" dirty="0">
-                <a:latin typeface="Times New Roman" charset="0"/>
-                <a:ea typeface="Times New Roman" charset="0"/>
-                <a:cs typeface="Times New Roman" charset="0"/>
-              </a:rPr>
-              <a:t>BY-SA </a:t>
-            </a:r>
-            <a:r>
-              <a:rPr lang="en-US" sz="2800" dirty="0">
-                <a:latin typeface="Times New Roman" charset="0"/>
-                <a:ea typeface="Times New Roman" charset="0"/>
-                <a:cs typeface="Times New Roman" charset="0"/>
-              </a:rPr>
-              <a:t>4.0. To view a copy of this license, visit </a:t>
+              <a:t>CC BY-SA 4.0. To view a copy of this license, visit </a:t>
             </a:r>
             <a:r>
               <a:rPr lang="en-US" sz="2800" dirty="0">
@@ -25312,16 +25302,7 @@
                 <a:cs typeface="Times New Roman" charset="0"/>
                 <a:hlinkClick r:id="rId2"/>
               </a:rPr>
-              <a:t>https://</a:t>
-            </a:r>
-            <a:r>
-              <a:rPr lang="en-US" sz="2800" dirty="0">
-                <a:latin typeface="Times New Roman" charset="0"/>
-                <a:ea typeface="Times New Roman" charset="0"/>
-                <a:cs typeface="Times New Roman" charset="0"/>
-                <a:hlinkClick r:id="rId2"/>
-              </a:rPr>
-              <a:t>creativecommons.org/licenses/by-sa/4.0</a:t>
+              <a:t>https://creativecommons.org/licenses/by-sa/4.0</a:t>
             </a:r>
             <a:r>
               <a:rPr lang="en-US" sz="2800" dirty="0">
@@ -25515,10 +25496,10 @@
           <p:cNvPr id="9" name="Rectangle 8">
             <a:extLst>
               <a:ext uri="{FF2B5EF4-FFF2-40B4-BE49-F238E27FC236}">
-                <a16:creationId xmlns="" xmlns:a16="http://schemas.microsoft.com/office/drawing/2014/main" id="{2FDF0794-1B86-42B2-B8C7-F60123E638ED}"/>
+                <a16:creationId xmlns:a16="http://schemas.microsoft.com/office/drawing/2014/main" xmlns="" id="{2FDF0794-1B86-42B2-B8C7-F60123E638ED}"/>
               </a:ext>
               <a:ext uri="{C183D7F6-B498-43B3-948B-1728B52AA6E4}">
-                <adec:decorative xmlns="" xmlns:adec="http://schemas.microsoft.com/office/drawing/2017/decorative" val="1"/>
+                <adec:decorative xmlns:adec="http://schemas.microsoft.com/office/drawing/2017/decorative" xmlns="" val="1"/>
               </a:ext>
             </a:extLst>
           </p:cNvPr>
@@ -25578,7 +25559,7 @@
           <p:cNvPr id="5" name="Picture 4">
             <a:extLst>
               <a:ext uri="{FF2B5EF4-FFF2-40B4-BE49-F238E27FC236}">
-                <a16:creationId xmlns="" xmlns:a16="http://schemas.microsoft.com/office/drawing/2014/main" id="{48C73C07-776C-43B1-9929-546A3147FC8C}"/>
+                <a16:creationId xmlns:a16="http://schemas.microsoft.com/office/drawing/2014/main" xmlns="" id="{48C73C07-776C-43B1-9929-546A3147FC8C}"/>
               </a:ext>
             </a:extLst>
           </p:cNvPr>
@@ -25607,10 +25588,10 @@
           <p:cNvPr id="11" name="Rectangle 10">
             <a:extLst>
               <a:ext uri="{FF2B5EF4-FFF2-40B4-BE49-F238E27FC236}">
-                <a16:creationId xmlns="" xmlns:a16="http://schemas.microsoft.com/office/drawing/2014/main" id="{C5373426-E26E-431D-959C-5DB96C0B6208}"/>
+                <a16:creationId xmlns:a16="http://schemas.microsoft.com/office/drawing/2014/main" xmlns="" id="{C5373426-E26E-431D-959C-5DB96C0B6208}"/>
               </a:ext>
               <a:ext uri="{C183D7F6-B498-43B3-948B-1728B52AA6E4}">
-                <adec:decorative xmlns="" xmlns:adec="http://schemas.microsoft.com/office/drawing/2017/decorative" val="1"/>
+                <adec:decorative xmlns:adec="http://schemas.microsoft.com/office/drawing/2017/decorative" xmlns="" val="1"/>
               </a:ext>
             </a:extLst>
           </p:cNvPr>
@@ -25672,7 +25653,7 @@
           <p:cNvPr id="2" name="Title 1">
             <a:extLst>
               <a:ext uri="{FF2B5EF4-FFF2-40B4-BE49-F238E27FC236}">
-                <a16:creationId xmlns="" xmlns:a16="http://schemas.microsoft.com/office/drawing/2014/main" id="{D33DE194-0A7D-421E-8C55-B97B2C35B93D}"/>
+                <a16:creationId xmlns:a16="http://schemas.microsoft.com/office/drawing/2014/main" xmlns="" id="{D33DE194-0A7D-421E-8C55-B97B2C35B93D}"/>
               </a:ext>
             </a:extLst>
           </p:cNvPr>
@@ -25711,10 +25692,10 @@
           <p:cNvPr id="13" name="Straight Connector 12">
             <a:extLst>
               <a:ext uri="{FF2B5EF4-FFF2-40B4-BE49-F238E27FC236}">
-                <a16:creationId xmlns="" xmlns:a16="http://schemas.microsoft.com/office/drawing/2014/main" id="{96D07482-83A3-4451-943C-B46961082957}"/>
+                <a16:creationId xmlns:a16="http://schemas.microsoft.com/office/drawing/2014/main" xmlns="" id="{96D07482-83A3-4451-943C-B46961082957}"/>
               </a:ext>
               <a:ext uri="{C183D7F6-B498-43B3-948B-1728B52AA6E4}">
-                <adec:decorative xmlns="" xmlns:adec="http://schemas.microsoft.com/office/drawing/2017/decorative" val="1"/>
+                <adec:decorative xmlns:adec="http://schemas.microsoft.com/office/drawing/2017/decorative" xmlns="" val="1"/>
               </a:ext>
             </a:extLst>
           </p:cNvPr>
@@ -25808,10 +25789,10 @@
           <p:cNvPr id="10" name="Rectangle 9">
             <a:extLst>
               <a:ext uri="{FF2B5EF4-FFF2-40B4-BE49-F238E27FC236}">
-                <a16:creationId xmlns="" xmlns:a16="http://schemas.microsoft.com/office/drawing/2014/main" id="{6109556B-EAE9-4435-B409-0519F2CBDB14}"/>
+                <a16:creationId xmlns:a16="http://schemas.microsoft.com/office/drawing/2014/main" xmlns="" id="{6109556B-EAE9-4435-B409-0519F2CBDB14}"/>
               </a:ext>
               <a:ext uri="{C183D7F6-B498-43B3-948B-1728B52AA6E4}">
-                <adec:decorative xmlns="" xmlns:adec="http://schemas.microsoft.com/office/drawing/2017/decorative" val="1"/>
+                <adec:decorative xmlns:adec="http://schemas.microsoft.com/office/drawing/2017/decorative" xmlns="" val="1"/>
               </a:ext>
             </a:extLst>
           </p:cNvPr>
@@ -25871,7 +25852,7 @@
           <p:cNvPr id="2" name="Title 1">
             <a:extLst>
               <a:ext uri="{FF2B5EF4-FFF2-40B4-BE49-F238E27FC236}">
-                <a16:creationId xmlns="" xmlns:a16="http://schemas.microsoft.com/office/drawing/2014/main" id="{29A9E6A4-AE7A-42E2-977F-3BFFE98CA697}"/>
+                <a16:creationId xmlns:a16="http://schemas.microsoft.com/office/drawing/2014/main" xmlns="" id="{29A9E6A4-AE7A-42E2-977F-3BFFE98CA697}"/>
               </a:ext>
             </a:extLst>
           </p:cNvPr>
@@ -25910,10 +25891,10 @@
           <p:cNvPr id="12" name="Straight Connector 11">
             <a:extLst>
               <a:ext uri="{FF2B5EF4-FFF2-40B4-BE49-F238E27FC236}">
-                <a16:creationId xmlns="" xmlns:a16="http://schemas.microsoft.com/office/drawing/2014/main" id="{5814CCBE-423E-41B2-A9F3-82679F490EF4}"/>
+                <a16:creationId xmlns:a16="http://schemas.microsoft.com/office/drawing/2014/main" xmlns="" id="{5814CCBE-423E-41B2-A9F3-82679F490EF4}"/>
               </a:ext>
               <a:ext uri="{C183D7F6-B498-43B3-948B-1728B52AA6E4}">
-                <adec:decorative xmlns="" xmlns:adec="http://schemas.microsoft.com/office/drawing/2017/decorative" val="1"/>
+                <adec:decorative xmlns:adec="http://schemas.microsoft.com/office/drawing/2017/decorative" xmlns="" val="1"/>
               </a:ext>
             </a:extLst>
           </p:cNvPr>
@@ -25962,7 +25943,7 @@
           <p:cNvPr id="3" name="Content Placeholder 2">
             <a:extLst>
               <a:ext uri="{FF2B5EF4-FFF2-40B4-BE49-F238E27FC236}">
-                <a16:creationId xmlns="" xmlns:a16="http://schemas.microsoft.com/office/drawing/2014/main" id="{080E24F3-1822-4BFF-BF7D-17E2E759AE7C}"/>
+                <a16:creationId xmlns:a16="http://schemas.microsoft.com/office/drawing/2014/main" xmlns="" id="{080E24F3-1822-4BFF-BF7D-17E2E759AE7C}"/>
               </a:ext>
             </a:extLst>
           </p:cNvPr>
@@ -26054,7 +26035,7 @@
           <p:cNvPr id="5" name="Picture 4">
             <a:extLst>
               <a:ext uri="{FF2B5EF4-FFF2-40B4-BE49-F238E27FC236}">
-                <a16:creationId xmlns="" xmlns:a16="http://schemas.microsoft.com/office/drawing/2014/main" id="{696BA665-054F-45E2-B5CF-5041261CA538}"/>
+                <a16:creationId xmlns:a16="http://schemas.microsoft.com/office/drawing/2014/main" xmlns="" id="{696BA665-054F-45E2-B5CF-5041261CA538}"/>
               </a:ext>
             </a:extLst>
           </p:cNvPr>
@@ -26120,7 +26101,7 @@
           <p:cNvPr id="2" name="Title 1">
             <a:extLst>
               <a:ext uri="{FF2B5EF4-FFF2-40B4-BE49-F238E27FC236}">
-                <a16:creationId xmlns="" xmlns:a16="http://schemas.microsoft.com/office/drawing/2014/main" id="{F24F037D-7D22-479A-ADC3-040CAFCF50C2}"/>
+                <a16:creationId xmlns:a16="http://schemas.microsoft.com/office/drawing/2014/main" xmlns="" id="{F24F037D-7D22-479A-ADC3-040CAFCF50C2}"/>
               </a:ext>
             </a:extLst>
           </p:cNvPr>
@@ -26148,7 +26129,7 @@
           <p:cNvPr id="5" name="Content Placeholder 4" descr="Database">
             <a:extLst>
               <a:ext uri="{FF2B5EF4-FFF2-40B4-BE49-F238E27FC236}">
-                <a16:creationId xmlns="" xmlns:a16="http://schemas.microsoft.com/office/drawing/2014/main" id="{810DE54E-2F01-46FB-BF78-FF8BC87969CC}"/>
+                <a16:creationId xmlns:a16="http://schemas.microsoft.com/office/drawing/2014/main" xmlns="" id="{810DE54E-2F01-46FB-BF78-FF8BC87969CC}"/>
               </a:ext>
             </a:extLst>
           </p:cNvPr>
@@ -26163,7 +26144,7 @@
           <a:blip r:embed="rId2">
             <a:extLst>
               <a:ext uri="{96DAC541-7B7A-43D3-8B79-37D633B846F1}">
-                <asvg:svgBlip xmlns="" xmlns:asvg="http://schemas.microsoft.com/office/drawing/2016/SVG/main" r:embed="rId3"/>
+                <asvg:svgBlip xmlns:asvg="http://schemas.microsoft.com/office/drawing/2016/SVG/main" xmlns="" r:embed="rId3"/>
               </a:ext>
             </a:extLst>
           </a:blip>
@@ -26183,7 +26164,7 @@
           <p:cNvPr id="7" name="Graphic 6" descr="Computer">
             <a:extLst>
               <a:ext uri="{FF2B5EF4-FFF2-40B4-BE49-F238E27FC236}">
-                <a16:creationId xmlns="" xmlns:a16="http://schemas.microsoft.com/office/drawing/2014/main" id="{CB146379-DE3A-4F99-8E8B-F6A9E3E4FF51}"/>
+                <a16:creationId xmlns:a16="http://schemas.microsoft.com/office/drawing/2014/main" xmlns="" id="{CB146379-DE3A-4F99-8E8B-F6A9E3E4FF51}"/>
               </a:ext>
             </a:extLst>
           </p:cNvPr>
@@ -26196,7 +26177,7 @@
           <a:blip r:embed="rId4">
             <a:extLst>
               <a:ext uri="{96DAC541-7B7A-43D3-8B79-37D633B846F1}">
-                <asvg:svgBlip xmlns="" xmlns:asvg="http://schemas.microsoft.com/office/drawing/2016/SVG/main" r:embed="rId5"/>
+                <asvg:svgBlip xmlns:asvg="http://schemas.microsoft.com/office/drawing/2016/SVG/main" xmlns="" r:embed="rId5"/>
               </a:ext>
             </a:extLst>
           </a:blip>
@@ -26219,7 +26200,7 @@
           <p:cNvPr id="12" name="Straight Connector 11">
             <a:extLst>
               <a:ext uri="{FF2B5EF4-FFF2-40B4-BE49-F238E27FC236}">
-                <a16:creationId xmlns="" xmlns:a16="http://schemas.microsoft.com/office/drawing/2014/main" id="{B5C721F4-50D6-4534-AAD2-0AC59B3B5810}"/>
+                <a16:creationId xmlns:a16="http://schemas.microsoft.com/office/drawing/2014/main" xmlns="" id="{B5C721F4-50D6-4534-AAD2-0AC59B3B5810}"/>
               </a:ext>
             </a:extLst>
           </p:cNvPr>
@@ -26259,7 +26240,7 @@
           <p:cNvPr id="6" name="TextBox 5">
             <a:extLst>
               <a:ext uri="{FF2B5EF4-FFF2-40B4-BE49-F238E27FC236}">
-                <a16:creationId xmlns="" xmlns:a16="http://schemas.microsoft.com/office/drawing/2014/main" id="{5762F2C4-2945-4B30-BFB6-1CD70DEF121E}"/>
+                <a16:creationId xmlns:a16="http://schemas.microsoft.com/office/drawing/2014/main" xmlns="" id="{5762F2C4-2945-4B30-BFB6-1CD70DEF121E}"/>
               </a:ext>
             </a:extLst>
           </p:cNvPr>
@@ -26294,7 +26275,7 @@
           <p:cNvPr id="8" name="TextBox 7">
             <a:extLst>
               <a:ext uri="{FF2B5EF4-FFF2-40B4-BE49-F238E27FC236}">
-                <a16:creationId xmlns="" xmlns:a16="http://schemas.microsoft.com/office/drawing/2014/main" id="{EFA66816-B728-455C-85A2-90B5FD142459}"/>
+                <a16:creationId xmlns:a16="http://schemas.microsoft.com/office/drawing/2014/main" xmlns="" id="{EFA66816-B728-455C-85A2-90B5FD142459}"/>
               </a:ext>
             </a:extLst>
           </p:cNvPr>
@@ -26329,7 +26310,7 @@
           <p:cNvPr id="11" name="TextBox 10">
             <a:extLst>
               <a:ext uri="{FF2B5EF4-FFF2-40B4-BE49-F238E27FC236}">
-                <a16:creationId xmlns="" xmlns:a16="http://schemas.microsoft.com/office/drawing/2014/main" id="{7924B171-AB20-4FAA-B977-76CF66B33BC3}"/>
+                <a16:creationId xmlns:a16="http://schemas.microsoft.com/office/drawing/2014/main" xmlns="" id="{7924B171-AB20-4FAA-B977-76CF66B33BC3}"/>
               </a:ext>
             </a:extLst>
           </p:cNvPr>
@@ -26364,7 +26345,7 @@
           <p:cNvPr id="18" name="Graphic 17" descr="Good Idea">
             <a:extLst>
               <a:ext uri="{FF2B5EF4-FFF2-40B4-BE49-F238E27FC236}">
-                <a16:creationId xmlns="" xmlns:a16="http://schemas.microsoft.com/office/drawing/2014/main" id="{C26062CD-B2C9-4754-97DC-16F9AD0B4C22}"/>
+                <a16:creationId xmlns:a16="http://schemas.microsoft.com/office/drawing/2014/main" xmlns="" id="{C26062CD-B2C9-4754-97DC-16F9AD0B4C22}"/>
               </a:ext>
             </a:extLst>
           </p:cNvPr>
@@ -26377,7 +26358,7 @@
           <a:blip r:embed="rId6">
             <a:extLst>
               <a:ext uri="{96DAC541-7B7A-43D3-8B79-37D633B846F1}">
-                <asvg:svgBlip xmlns="" xmlns:asvg="http://schemas.microsoft.com/office/drawing/2016/SVG/main" r:embed="rId7"/>
+                <asvg:svgBlip xmlns:asvg="http://schemas.microsoft.com/office/drawing/2016/SVG/main" xmlns="" r:embed="rId7"/>
               </a:ext>
             </a:extLst>
           </a:blip>
@@ -26400,7 +26381,7 @@
           <p:cNvPr id="20" name="TextBox 19">
             <a:extLst>
               <a:ext uri="{FF2B5EF4-FFF2-40B4-BE49-F238E27FC236}">
-                <a16:creationId xmlns="" xmlns:a16="http://schemas.microsoft.com/office/drawing/2014/main" id="{5497ACD7-E79E-4961-B74A-A182584235D2}"/>
+                <a16:creationId xmlns:a16="http://schemas.microsoft.com/office/drawing/2014/main" xmlns="" id="{5497ACD7-E79E-4961-B74A-A182584235D2}"/>
               </a:ext>
             </a:extLst>
           </p:cNvPr>
@@ -26488,7 +26469,7 @@
           <p:cNvPr id="2" name="Title 1">
             <a:extLst>
               <a:ext uri="{FF2B5EF4-FFF2-40B4-BE49-F238E27FC236}">
-                <a16:creationId xmlns="" xmlns:a16="http://schemas.microsoft.com/office/drawing/2014/main" id="{F24F037D-7D22-479A-ADC3-040CAFCF50C2}"/>
+                <a16:creationId xmlns:a16="http://schemas.microsoft.com/office/drawing/2014/main" xmlns="" id="{F24F037D-7D22-479A-ADC3-040CAFCF50C2}"/>
               </a:ext>
             </a:extLst>
           </p:cNvPr>
@@ -26516,7 +26497,7 @@
           <p:cNvPr id="5" name="Content Placeholder 4" descr="Database">
             <a:extLst>
               <a:ext uri="{FF2B5EF4-FFF2-40B4-BE49-F238E27FC236}">
-                <a16:creationId xmlns="" xmlns:a16="http://schemas.microsoft.com/office/drawing/2014/main" id="{810DE54E-2F01-46FB-BF78-FF8BC87969CC}"/>
+                <a16:creationId xmlns:a16="http://schemas.microsoft.com/office/drawing/2014/main" xmlns="" id="{810DE54E-2F01-46FB-BF78-FF8BC87969CC}"/>
               </a:ext>
             </a:extLst>
           </p:cNvPr>
@@ -26531,7 +26512,7 @@
           <a:blip r:embed="rId2">
             <a:extLst>
               <a:ext uri="{96DAC541-7B7A-43D3-8B79-37D633B846F1}">
-                <asvg:svgBlip xmlns="" xmlns:asvg="http://schemas.microsoft.com/office/drawing/2016/SVG/main" r:embed="rId3"/>
+                <asvg:svgBlip xmlns:asvg="http://schemas.microsoft.com/office/drawing/2016/SVG/main" xmlns="" r:embed="rId3"/>
               </a:ext>
             </a:extLst>
           </a:blip>
@@ -26551,7 +26532,7 @@
           <p:cNvPr id="7" name="Graphic 6" descr="Computer">
             <a:extLst>
               <a:ext uri="{FF2B5EF4-FFF2-40B4-BE49-F238E27FC236}">
-                <a16:creationId xmlns="" xmlns:a16="http://schemas.microsoft.com/office/drawing/2014/main" id="{CB146379-DE3A-4F99-8E8B-F6A9E3E4FF51}"/>
+                <a16:creationId xmlns:a16="http://schemas.microsoft.com/office/drawing/2014/main" xmlns="" id="{CB146379-DE3A-4F99-8E8B-F6A9E3E4FF51}"/>
               </a:ext>
             </a:extLst>
           </p:cNvPr>
@@ -26564,7 +26545,7 @@
           <a:blip r:embed="rId4">
             <a:extLst>
               <a:ext uri="{96DAC541-7B7A-43D3-8B79-37D633B846F1}">
-                <asvg:svgBlip xmlns="" xmlns:asvg="http://schemas.microsoft.com/office/drawing/2016/SVG/main" r:embed="rId5"/>
+                <asvg:svgBlip xmlns:asvg="http://schemas.microsoft.com/office/drawing/2016/SVG/main" xmlns="" r:embed="rId5"/>
               </a:ext>
             </a:extLst>
           </a:blip>
@@ -26587,7 +26568,7 @@
           <p:cNvPr id="9" name="Graphic 8" descr="Server">
             <a:extLst>
               <a:ext uri="{FF2B5EF4-FFF2-40B4-BE49-F238E27FC236}">
-                <a16:creationId xmlns="" xmlns:a16="http://schemas.microsoft.com/office/drawing/2014/main" id="{35A58F10-B4CB-4D45-8EC0-AF26BE8C304C}"/>
+                <a16:creationId xmlns:a16="http://schemas.microsoft.com/office/drawing/2014/main" xmlns="" id="{35A58F10-B4CB-4D45-8EC0-AF26BE8C304C}"/>
               </a:ext>
             </a:extLst>
           </p:cNvPr>
@@ -26600,7 +26581,7 @@
           <a:blip r:embed="rId6">
             <a:extLst>
               <a:ext uri="{96DAC541-7B7A-43D3-8B79-37D633B846F1}">
-                <asvg:svgBlip xmlns="" xmlns:asvg="http://schemas.microsoft.com/office/drawing/2016/SVG/main" r:embed="rId7"/>
+                <asvg:svgBlip xmlns:asvg="http://schemas.microsoft.com/office/drawing/2016/SVG/main" xmlns="" r:embed="rId7"/>
               </a:ext>
             </a:extLst>
           </a:blip>
@@ -26623,7 +26604,7 @@
           <p:cNvPr id="10" name="Content Placeholder 4" descr="Database">
             <a:extLst>
               <a:ext uri="{FF2B5EF4-FFF2-40B4-BE49-F238E27FC236}">
-                <a16:creationId xmlns="" xmlns:a16="http://schemas.microsoft.com/office/drawing/2014/main" id="{87830537-D818-426E-BB07-CE058CC1D029}"/>
+                <a16:creationId xmlns:a16="http://schemas.microsoft.com/office/drawing/2014/main" xmlns="" id="{87830537-D818-426E-BB07-CE058CC1D029}"/>
               </a:ext>
             </a:extLst>
           </p:cNvPr>
@@ -26636,7 +26617,7 @@
           <a:blip r:embed="rId2">
             <a:extLst>
               <a:ext uri="{96DAC541-7B7A-43D3-8B79-37D633B846F1}">
-                <asvg:svgBlip xmlns="" xmlns:asvg="http://schemas.microsoft.com/office/drawing/2016/SVG/main" r:embed="rId3"/>
+                <asvg:svgBlip xmlns:asvg="http://schemas.microsoft.com/office/drawing/2016/SVG/main" xmlns="" r:embed="rId3"/>
               </a:ext>
             </a:extLst>
           </a:blip>
@@ -26659,7 +26640,7 @@
           <p:cNvPr id="12" name="Straight Connector 11">
             <a:extLst>
               <a:ext uri="{FF2B5EF4-FFF2-40B4-BE49-F238E27FC236}">
-                <a16:creationId xmlns="" xmlns:a16="http://schemas.microsoft.com/office/drawing/2014/main" id="{B5C721F4-50D6-4534-AAD2-0AC59B3B5810}"/>
+                <a16:creationId xmlns:a16="http://schemas.microsoft.com/office/drawing/2014/main" xmlns="" id="{B5C721F4-50D6-4534-AAD2-0AC59B3B5810}"/>
               </a:ext>
             </a:extLst>
           </p:cNvPr>
@@ -26699,7 +26680,7 @@
           <p:cNvPr id="16" name="Straight Connector 15">
             <a:extLst>
               <a:ext uri="{FF2B5EF4-FFF2-40B4-BE49-F238E27FC236}">
-                <a16:creationId xmlns="" xmlns:a16="http://schemas.microsoft.com/office/drawing/2014/main" id="{E980ADB6-24F0-4DEF-9800-876AD2BCB20C}"/>
+                <a16:creationId xmlns:a16="http://schemas.microsoft.com/office/drawing/2014/main" xmlns="" id="{E980ADB6-24F0-4DEF-9800-876AD2BCB20C}"/>
               </a:ext>
             </a:extLst>
           </p:cNvPr>
@@ -26739,7 +26720,7 @@
           <p:cNvPr id="22" name="Graphic 21" descr="Transfer">
             <a:extLst>
               <a:ext uri="{FF2B5EF4-FFF2-40B4-BE49-F238E27FC236}">
-                <a16:creationId xmlns="" xmlns:a16="http://schemas.microsoft.com/office/drawing/2014/main" id="{5E3356BC-FA11-44C9-AA1D-6BF4CC97EA09}"/>
+                <a16:creationId xmlns:a16="http://schemas.microsoft.com/office/drawing/2014/main" xmlns="" id="{5E3356BC-FA11-44C9-AA1D-6BF4CC97EA09}"/>
               </a:ext>
             </a:extLst>
           </p:cNvPr>
@@ -26752,7 +26733,7 @@
           <a:blip r:embed="rId8">
             <a:extLst>
               <a:ext uri="{96DAC541-7B7A-43D3-8B79-37D633B846F1}">
-                <asvg:svgBlip xmlns="" xmlns:asvg="http://schemas.microsoft.com/office/drawing/2016/SVG/main" r:embed="rId9"/>
+                <asvg:svgBlip xmlns:asvg="http://schemas.microsoft.com/office/drawing/2016/SVG/main" xmlns="" r:embed="rId9"/>
               </a:ext>
             </a:extLst>
           </a:blip>
@@ -26775,7 +26756,7 @@
           <p:cNvPr id="23" name="TextBox 22">
             <a:extLst>
               <a:ext uri="{FF2B5EF4-FFF2-40B4-BE49-F238E27FC236}">
-                <a16:creationId xmlns="" xmlns:a16="http://schemas.microsoft.com/office/drawing/2014/main" id="{DCB0E2E8-C877-4CFD-82C6-4F784D4DBF21}"/>
+                <a16:creationId xmlns:a16="http://schemas.microsoft.com/office/drawing/2014/main" xmlns="" id="{DCB0E2E8-C877-4CFD-82C6-4F784D4DBF21}"/>
               </a:ext>
             </a:extLst>
           </p:cNvPr>
@@ -26877,7 +26858,7 @@
           <p:cNvPr id="24" name="TextBox 23">
             <a:extLst>
               <a:ext uri="{FF2B5EF4-FFF2-40B4-BE49-F238E27FC236}">
-                <a16:creationId xmlns="" xmlns:a16="http://schemas.microsoft.com/office/drawing/2014/main" id="{9818DE52-DD04-47F7-BCC1-B097FBD31411}"/>
+                <a16:creationId xmlns:a16="http://schemas.microsoft.com/office/drawing/2014/main" xmlns="" id="{9818DE52-DD04-47F7-BCC1-B097FBD31411}"/>
               </a:ext>
             </a:extLst>
           </p:cNvPr>
@@ -26912,7 +26893,7 @@
           <p:cNvPr id="25" name="TextBox 24">
             <a:extLst>
               <a:ext uri="{FF2B5EF4-FFF2-40B4-BE49-F238E27FC236}">
-                <a16:creationId xmlns="" xmlns:a16="http://schemas.microsoft.com/office/drawing/2014/main" id="{7268F622-250C-4DD2-97E9-E0586D10C92D}"/>
+                <a16:creationId xmlns:a16="http://schemas.microsoft.com/office/drawing/2014/main" xmlns="" id="{7268F622-250C-4DD2-97E9-E0586D10C92D}"/>
               </a:ext>
             </a:extLst>
           </p:cNvPr>
@@ -26977,7 +26958,7 @@
           <p:cNvPr id="2" name="Title 1">
             <a:extLst>
               <a:ext uri="{FF2B5EF4-FFF2-40B4-BE49-F238E27FC236}">
-                <a16:creationId xmlns="" xmlns:a16="http://schemas.microsoft.com/office/drawing/2014/main" id="{F24F037D-7D22-479A-ADC3-040CAFCF50C2}"/>
+                <a16:creationId xmlns:a16="http://schemas.microsoft.com/office/drawing/2014/main" xmlns="" id="{F24F037D-7D22-479A-ADC3-040CAFCF50C2}"/>
               </a:ext>
             </a:extLst>
           </p:cNvPr>
@@ -27005,7 +26986,7 @@
           <p:cNvPr id="5" name="Content Placeholder 4" descr="Database">
             <a:extLst>
               <a:ext uri="{FF2B5EF4-FFF2-40B4-BE49-F238E27FC236}">
-                <a16:creationId xmlns="" xmlns:a16="http://schemas.microsoft.com/office/drawing/2014/main" id="{810DE54E-2F01-46FB-BF78-FF8BC87969CC}"/>
+                <a16:creationId xmlns:a16="http://schemas.microsoft.com/office/drawing/2014/main" xmlns="" id="{810DE54E-2F01-46FB-BF78-FF8BC87969CC}"/>
               </a:ext>
             </a:extLst>
           </p:cNvPr>
@@ -27020,7 +27001,7 @@
           <a:blip r:embed="rId2">
             <a:extLst>
               <a:ext uri="{96DAC541-7B7A-43D3-8B79-37D633B846F1}">
-                <asvg:svgBlip xmlns="" xmlns:asvg="http://schemas.microsoft.com/office/drawing/2016/SVG/main" r:embed="rId3"/>
+                <asvg:svgBlip xmlns:asvg="http://schemas.microsoft.com/office/drawing/2016/SVG/main" xmlns="" r:embed="rId3"/>
               </a:ext>
             </a:extLst>
           </a:blip>
@@ -27040,7 +27021,7 @@
           <p:cNvPr id="7" name="Graphic 6" descr="Computer">
             <a:extLst>
               <a:ext uri="{FF2B5EF4-FFF2-40B4-BE49-F238E27FC236}">
-                <a16:creationId xmlns="" xmlns:a16="http://schemas.microsoft.com/office/drawing/2014/main" id="{CB146379-DE3A-4F99-8E8B-F6A9E3E4FF51}"/>
+                <a16:creationId xmlns:a16="http://schemas.microsoft.com/office/drawing/2014/main" xmlns="" id="{CB146379-DE3A-4F99-8E8B-F6A9E3E4FF51}"/>
               </a:ext>
             </a:extLst>
           </p:cNvPr>
@@ -27053,7 +27034,7 @@
           <a:blip r:embed="rId4">
             <a:extLst>
               <a:ext uri="{96DAC541-7B7A-43D3-8B79-37D633B846F1}">
-                <asvg:svgBlip xmlns="" xmlns:asvg="http://schemas.microsoft.com/office/drawing/2016/SVG/main" r:embed="rId5"/>
+                <asvg:svgBlip xmlns:asvg="http://schemas.microsoft.com/office/drawing/2016/SVG/main" xmlns="" r:embed="rId5"/>
               </a:ext>
             </a:extLst>
           </a:blip>
@@ -27076,7 +27057,7 @@
           <p:cNvPr id="9" name="Graphic 8" descr="Server">
             <a:extLst>
               <a:ext uri="{FF2B5EF4-FFF2-40B4-BE49-F238E27FC236}">
-                <a16:creationId xmlns="" xmlns:a16="http://schemas.microsoft.com/office/drawing/2014/main" id="{35A58F10-B4CB-4D45-8EC0-AF26BE8C304C}"/>
+                <a16:creationId xmlns:a16="http://schemas.microsoft.com/office/drawing/2014/main" xmlns="" id="{35A58F10-B4CB-4D45-8EC0-AF26BE8C304C}"/>
               </a:ext>
             </a:extLst>
           </p:cNvPr>
@@ -27089,7 +27070,7 @@
           <a:blip r:embed="rId6">
             <a:extLst>
               <a:ext uri="{96DAC541-7B7A-43D3-8B79-37D633B846F1}">
-                <asvg:svgBlip xmlns="" xmlns:asvg="http://schemas.microsoft.com/office/drawing/2016/SVG/main" r:embed="rId7"/>
+                <asvg:svgBlip xmlns:asvg="http://schemas.microsoft.com/office/drawing/2016/SVG/main" xmlns="" r:embed="rId7"/>
               </a:ext>
             </a:extLst>
           </a:blip>
@@ -27112,7 +27093,7 @@
           <p:cNvPr id="10" name="Content Placeholder 4" descr="Database">
             <a:extLst>
               <a:ext uri="{FF2B5EF4-FFF2-40B4-BE49-F238E27FC236}">
-                <a16:creationId xmlns="" xmlns:a16="http://schemas.microsoft.com/office/drawing/2014/main" id="{87830537-D818-426E-BB07-CE058CC1D029}"/>
+                <a16:creationId xmlns:a16="http://schemas.microsoft.com/office/drawing/2014/main" xmlns="" id="{87830537-D818-426E-BB07-CE058CC1D029}"/>
               </a:ext>
             </a:extLst>
           </p:cNvPr>
@@ -27125,7 +27106,7 @@
           <a:blip r:embed="rId2">
             <a:extLst>
               <a:ext uri="{96DAC541-7B7A-43D3-8B79-37D633B846F1}">
-                <asvg:svgBlip xmlns="" xmlns:asvg="http://schemas.microsoft.com/office/drawing/2016/SVG/main" r:embed="rId3"/>
+                <asvg:svgBlip xmlns:asvg="http://schemas.microsoft.com/office/drawing/2016/SVG/main" xmlns="" r:embed="rId3"/>
               </a:ext>
             </a:extLst>
           </a:blip>
@@ -27148,7 +27129,7 @@
           <p:cNvPr id="12" name="Straight Connector 11">
             <a:extLst>
               <a:ext uri="{FF2B5EF4-FFF2-40B4-BE49-F238E27FC236}">
-                <a16:creationId xmlns="" xmlns:a16="http://schemas.microsoft.com/office/drawing/2014/main" id="{B5C721F4-50D6-4534-AAD2-0AC59B3B5810}"/>
+                <a16:creationId xmlns:a16="http://schemas.microsoft.com/office/drawing/2014/main" xmlns="" id="{B5C721F4-50D6-4534-AAD2-0AC59B3B5810}"/>
               </a:ext>
             </a:extLst>
           </p:cNvPr>
@@ -27188,7 +27169,7 @@
           <p:cNvPr id="16" name="Straight Connector 15">
             <a:extLst>
               <a:ext uri="{FF2B5EF4-FFF2-40B4-BE49-F238E27FC236}">
-                <a16:creationId xmlns="" xmlns:a16="http://schemas.microsoft.com/office/drawing/2014/main" id="{E980ADB6-24F0-4DEF-9800-876AD2BCB20C}"/>
+                <a16:creationId xmlns:a16="http://schemas.microsoft.com/office/drawing/2014/main" xmlns="" id="{E980ADB6-24F0-4DEF-9800-876AD2BCB20C}"/>
               </a:ext>
             </a:extLst>
           </p:cNvPr>
@@ -27228,7 +27209,7 @@
           <p:cNvPr id="22" name="Graphic 21" descr="Transfer">
             <a:extLst>
               <a:ext uri="{FF2B5EF4-FFF2-40B4-BE49-F238E27FC236}">
-                <a16:creationId xmlns="" xmlns:a16="http://schemas.microsoft.com/office/drawing/2014/main" id="{5E3356BC-FA11-44C9-AA1D-6BF4CC97EA09}"/>
+                <a16:creationId xmlns:a16="http://schemas.microsoft.com/office/drawing/2014/main" xmlns="" id="{5E3356BC-FA11-44C9-AA1D-6BF4CC97EA09}"/>
               </a:ext>
             </a:extLst>
           </p:cNvPr>
@@ -27241,7 +27222,7 @@
           <a:blip r:embed="rId8">
             <a:extLst>
               <a:ext uri="{96DAC541-7B7A-43D3-8B79-37D633B846F1}">
-                <asvg:svgBlip xmlns="" xmlns:asvg="http://schemas.microsoft.com/office/drawing/2016/SVG/main" r:embed="rId9"/>
+                <asvg:svgBlip xmlns:asvg="http://schemas.microsoft.com/office/drawing/2016/SVG/main" xmlns="" r:embed="rId9"/>
               </a:ext>
             </a:extLst>
           </a:blip>
@@ -27264,7 +27245,7 @@
           <p:cNvPr id="23" name="TextBox 22">
             <a:extLst>
               <a:ext uri="{FF2B5EF4-FFF2-40B4-BE49-F238E27FC236}">
-                <a16:creationId xmlns="" xmlns:a16="http://schemas.microsoft.com/office/drawing/2014/main" id="{DCB0E2E8-C877-4CFD-82C6-4F784D4DBF21}"/>
+                <a16:creationId xmlns:a16="http://schemas.microsoft.com/office/drawing/2014/main" xmlns="" id="{DCB0E2E8-C877-4CFD-82C6-4F784D4DBF21}"/>
               </a:ext>
             </a:extLst>
           </p:cNvPr>
@@ -27366,7 +27347,7 @@
           <p:cNvPr id="24" name="TextBox 23">
             <a:extLst>
               <a:ext uri="{FF2B5EF4-FFF2-40B4-BE49-F238E27FC236}">
-                <a16:creationId xmlns="" xmlns:a16="http://schemas.microsoft.com/office/drawing/2014/main" id="{9818DE52-DD04-47F7-BCC1-B097FBD31411}"/>
+                <a16:creationId xmlns:a16="http://schemas.microsoft.com/office/drawing/2014/main" xmlns="" id="{9818DE52-DD04-47F7-BCC1-B097FBD31411}"/>
               </a:ext>
             </a:extLst>
           </p:cNvPr>
@@ -27401,7 +27382,7 @@
           <p:cNvPr id="25" name="TextBox 24">
             <a:extLst>
               <a:ext uri="{FF2B5EF4-FFF2-40B4-BE49-F238E27FC236}">
-                <a16:creationId xmlns="" xmlns:a16="http://schemas.microsoft.com/office/drawing/2014/main" id="{7268F622-250C-4DD2-97E9-E0586D10C92D}"/>
+                <a16:creationId xmlns:a16="http://schemas.microsoft.com/office/drawing/2014/main" xmlns="" id="{7268F622-250C-4DD2-97E9-E0586D10C92D}"/>
               </a:ext>
             </a:extLst>
           </p:cNvPr>
@@ -27436,7 +27417,7 @@
           <p:cNvPr id="3" name="TextBox 2">
             <a:extLst>
               <a:ext uri="{FF2B5EF4-FFF2-40B4-BE49-F238E27FC236}">
-                <a16:creationId xmlns="" xmlns:a16="http://schemas.microsoft.com/office/drawing/2014/main" id="{B01756E5-E8CE-4951-A481-5CDBB9408229}"/>
+                <a16:creationId xmlns:a16="http://schemas.microsoft.com/office/drawing/2014/main" xmlns="" id="{B01756E5-E8CE-4951-A481-5CDBB9408229}"/>
               </a:ext>
             </a:extLst>
           </p:cNvPr>
@@ -27501,7 +27482,7 @@
           <p:cNvPr id="2" name="Title 1">
             <a:extLst>
               <a:ext uri="{FF2B5EF4-FFF2-40B4-BE49-F238E27FC236}">
-                <a16:creationId xmlns="" xmlns:a16="http://schemas.microsoft.com/office/drawing/2014/main" id="{F24F037D-7D22-479A-ADC3-040CAFCF50C2}"/>
+                <a16:creationId xmlns:a16="http://schemas.microsoft.com/office/drawing/2014/main" xmlns="" id="{F24F037D-7D22-479A-ADC3-040CAFCF50C2}"/>
               </a:ext>
             </a:extLst>
           </p:cNvPr>
@@ -27529,7 +27510,7 @@
           <p:cNvPr id="7" name="Graphic 6" descr="Computer">
             <a:extLst>
               <a:ext uri="{FF2B5EF4-FFF2-40B4-BE49-F238E27FC236}">
-                <a16:creationId xmlns="" xmlns:a16="http://schemas.microsoft.com/office/drawing/2014/main" id="{CB146379-DE3A-4F99-8E8B-F6A9E3E4FF51}"/>
+                <a16:creationId xmlns:a16="http://schemas.microsoft.com/office/drawing/2014/main" xmlns="" id="{CB146379-DE3A-4F99-8E8B-F6A9E3E4FF51}"/>
               </a:ext>
             </a:extLst>
           </p:cNvPr>
@@ -27542,7 +27523,7 @@
           <a:blip r:embed="rId2">
             <a:extLst>
               <a:ext uri="{96DAC541-7B7A-43D3-8B79-37D633B846F1}">
-                <asvg:svgBlip xmlns="" xmlns:asvg="http://schemas.microsoft.com/office/drawing/2016/SVG/main" r:embed="rId3"/>
+                <asvg:svgBlip xmlns:asvg="http://schemas.microsoft.com/office/drawing/2016/SVG/main" xmlns="" r:embed="rId3"/>
               </a:ext>
             </a:extLst>
           </a:blip>
@@ -27565,7 +27546,7 @@
           <p:cNvPr id="9" name="Graphic 8" descr="Server">
             <a:extLst>
               <a:ext uri="{FF2B5EF4-FFF2-40B4-BE49-F238E27FC236}">
-                <a16:creationId xmlns="" xmlns:a16="http://schemas.microsoft.com/office/drawing/2014/main" id="{35A58F10-B4CB-4D45-8EC0-AF26BE8C304C}"/>
+                <a16:creationId xmlns:a16="http://schemas.microsoft.com/office/drawing/2014/main" xmlns="" id="{35A58F10-B4CB-4D45-8EC0-AF26BE8C304C}"/>
               </a:ext>
             </a:extLst>
           </p:cNvPr>
@@ -27578,7 +27559,7 @@
           <a:blip r:embed="rId4">
             <a:extLst>
               <a:ext uri="{96DAC541-7B7A-43D3-8B79-37D633B846F1}">
-                <asvg:svgBlip xmlns="" xmlns:asvg="http://schemas.microsoft.com/office/drawing/2016/SVG/main" r:embed="rId5"/>
+                <asvg:svgBlip xmlns:asvg="http://schemas.microsoft.com/office/drawing/2016/SVG/main" xmlns="" r:embed="rId5"/>
               </a:ext>
             </a:extLst>
           </a:blip>
@@ -27601,7 +27582,7 @@
           <p:cNvPr id="22" name="Graphic 21" descr="Transfer">
             <a:extLst>
               <a:ext uri="{FF2B5EF4-FFF2-40B4-BE49-F238E27FC236}">
-                <a16:creationId xmlns="" xmlns:a16="http://schemas.microsoft.com/office/drawing/2014/main" id="{5E3356BC-FA11-44C9-AA1D-6BF4CC97EA09}"/>
+                <a16:creationId xmlns:a16="http://schemas.microsoft.com/office/drawing/2014/main" xmlns="" id="{5E3356BC-FA11-44C9-AA1D-6BF4CC97EA09}"/>
               </a:ext>
             </a:extLst>
           </p:cNvPr>
@@ -27614,7 +27595,7 @@
           <a:blip r:embed="rId6">
             <a:extLst>
               <a:ext uri="{96DAC541-7B7A-43D3-8B79-37D633B846F1}">
-                <asvg:svgBlip xmlns="" xmlns:asvg="http://schemas.microsoft.com/office/drawing/2016/SVG/main" r:embed="rId7"/>
+                <asvg:svgBlip xmlns:asvg="http://schemas.microsoft.com/office/drawing/2016/SVG/main" xmlns="" r:embed="rId7"/>
               </a:ext>
             </a:extLst>
           </a:blip>
@@ -27637,7 +27618,7 @@
           <p:cNvPr id="24" name="TextBox 23">
             <a:extLst>
               <a:ext uri="{FF2B5EF4-FFF2-40B4-BE49-F238E27FC236}">
-                <a16:creationId xmlns="" xmlns:a16="http://schemas.microsoft.com/office/drawing/2014/main" id="{9818DE52-DD04-47F7-BCC1-B097FBD31411}"/>
+                <a16:creationId xmlns:a16="http://schemas.microsoft.com/office/drawing/2014/main" xmlns="" id="{9818DE52-DD04-47F7-BCC1-B097FBD31411}"/>
               </a:ext>
             </a:extLst>
           </p:cNvPr>
@@ -27672,7 +27653,7 @@
           <p:cNvPr id="25" name="TextBox 24">
             <a:extLst>
               <a:ext uri="{FF2B5EF4-FFF2-40B4-BE49-F238E27FC236}">
-                <a16:creationId xmlns="" xmlns:a16="http://schemas.microsoft.com/office/drawing/2014/main" id="{7268F622-250C-4DD2-97E9-E0586D10C92D}"/>
+                <a16:creationId xmlns:a16="http://schemas.microsoft.com/office/drawing/2014/main" xmlns="" id="{7268F622-250C-4DD2-97E9-E0586D10C92D}"/>
               </a:ext>
             </a:extLst>
           </p:cNvPr>
@@ -27707,7 +27688,7 @@
           <p:cNvPr id="8" name="TextBox 7">
             <a:extLst>
               <a:ext uri="{FF2B5EF4-FFF2-40B4-BE49-F238E27FC236}">
-                <a16:creationId xmlns="" xmlns:a16="http://schemas.microsoft.com/office/drawing/2014/main" id="{3F94FB85-0477-4DDC-8412-EBA83FF67868}"/>
+                <a16:creationId xmlns:a16="http://schemas.microsoft.com/office/drawing/2014/main" xmlns="" id="{3F94FB85-0477-4DDC-8412-EBA83FF67868}"/>
               </a:ext>
             </a:extLst>
           </p:cNvPr>
@@ -27774,7 +27755,7 @@
           <p:cNvPr id="11" name="TextBox 10">
             <a:extLst>
               <a:ext uri="{FF2B5EF4-FFF2-40B4-BE49-F238E27FC236}">
-                <a16:creationId xmlns="" xmlns:a16="http://schemas.microsoft.com/office/drawing/2014/main" id="{A83B449A-0BC2-46C8-9539-02644646732E}"/>
+                <a16:creationId xmlns:a16="http://schemas.microsoft.com/office/drawing/2014/main" xmlns="" id="{A83B449A-0BC2-46C8-9539-02644646732E}"/>
               </a:ext>
             </a:extLst>
           </p:cNvPr>
@@ -27809,7 +27790,7 @@
           <p:cNvPr id="14" name="Graphic 13" descr="Key">
             <a:extLst>
               <a:ext uri="{FF2B5EF4-FFF2-40B4-BE49-F238E27FC236}">
-                <a16:creationId xmlns="" xmlns:a16="http://schemas.microsoft.com/office/drawing/2014/main" id="{3BC8A0B3-2799-40B6-B1F5-C80F1FB98878}"/>
+                <a16:creationId xmlns:a16="http://schemas.microsoft.com/office/drawing/2014/main" xmlns="" id="{3BC8A0B3-2799-40B6-B1F5-C80F1FB98878}"/>
               </a:ext>
             </a:extLst>
           </p:cNvPr>
@@ -27822,7 +27803,7 @@
           <a:blip r:embed="rId8">
             <a:extLst>
               <a:ext uri="{96DAC541-7B7A-43D3-8B79-37D633B846F1}">
-                <asvg:svgBlip xmlns="" xmlns:asvg="http://schemas.microsoft.com/office/drawing/2016/SVG/main" r:embed="rId9"/>
+                <asvg:svgBlip xmlns:asvg="http://schemas.microsoft.com/office/drawing/2016/SVG/main" xmlns="" r:embed="rId9"/>
               </a:ext>
             </a:extLst>
           </a:blip>
@@ -27845,7 +27826,7 @@
           <p:cNvPr id="17" name="Graphic 16" descr="Spinning Plates">
             <a:extLst>
               <a:ext uri="{FF2B5EF4-FFF2-40B4-BE49-F238E27FC236}">
-                <a16:creationId xmlns="" xmlns:a16="http://schemas.microsoft.com/office/drawing/2014/main" id="{12B8C1DC-26A6-422C-A6DA-F936A560842C}"/>
+                <a16:creationId xmlns:a16="http://schemas.microsoft.com/office/drawing/2014/main" xmlns="" id="{12B8C1DC-26A6-422C-A6DA-F936A560842C}"/>
               </a:ext>
             </a:extLst>
           </p:cNvPr>
@@ -27858,7 +27839,7 @@
           <a:blip r:embed="rId10">
             <a:extLst>
               <a:ext uri="{96DAC541-7B7A-43D3-8B79-37D633B846F1}">
-                <asvg:svgBlip xmlns="" xmlns:asvg="http://schemas.microsoft.com/office/drawing/2016/SVG/main" r:embed="rId11"/>
+                <asvg:svgBlip xmlns:asvg="http://schemas.microsoft.com/office/drawing/2016/SVG/main" xmlns="" r:embed="rId11"/>
               </a:ext>
             </a:extLst>
           </a:blip>
@@ -27881,7 +27862,7 @@
           <p:cNvPr id="18" name="TextBox 17">
             <a:extLst>
               <a:ext uri="{FF2B5EF4-FFF2-40B4-BE49-F238E27FC236}">
-                <a16:creationId xmlns="" xmlns:a16="http://schemas.microsoft.com/office/drawing/2014/main" id="{60A4B2F5-3749-4CA3-80A4-7C044C553A6D}"/>
+                <a16:creationId xmlns:a16="http://schemas.microsoft.com/office/drawing/2014/main" xmlns="" id="{60A4B2F5-3749-4CA3-80A4-7C044C553A6D}"/>
               </a:ext>
             </a:extLst>
           </p:cNvPr>
@@ -27932,7 +27913,7 @@
           <p:cNvPr id="26" name="Picture 25" descr="RSA one time password keyfob&#10;">
             <a:extLst>
               <a:ext uri="{FF2B5EF4-FFF2-40B4-BE49-F238E27FC236}">
-                <a16:creationId xmlns="" xmlns:a16="http://schemas.microsoft.com/office/drawing/2014/main" id="{5DCF78AA-1897-45DA-BC6C-3241A29B580F}"/>
+                <a16:creationId xmlns:a16="http://schemas.microsoft.com/office/drawing/2014/main" xmlns="" id="{5DCF78AA-1897-45DA-BC6C-3241A29B580F}"/>
               </a:ext>
             </a:extLst>
           </p:cNvPr>
@@ -27962,7 +27943,7 @@
           <p:cNvPr id="27" name="TextBox 26">
             <a:extLst>
               <a:ext uri="{FF2B5EF4-FFF2-40B4-BE49-F238E27FC236}">
-                <a16:creationId xmlns="" xmlns:a16="http://schemas.microsoft.com/office/drawing/2014/main" id="{74E9DB62-6506-4F72-B74A-18DC6F84A403}"/>
+                <a16:creationId xmlns:a16="http://schemas.microsoft.com/office/drawing/2014/main" xmlns="" id="{74E9DB62-6506-4F72-B74A-18DC6F84A403}"/>
               </a:ext>
             </a:extLst>
           </p:cNvPr>
@@ -28027,7 +28008,7 @@
           <p:cNvPr id="2" name="Title 1">
             <a:extLst>
               <a:ext uri="{FF2B5EF4-FFF2-40B4-BE49-F238E27FC236}">
-                <a16:creationId xmlns="" xmlns:a16="http://schemas.microsoft.com/office/drawing/2014/main" id="{2AB034E0-008F-43F5-8BAB-A81D72627EF6}"/>
+                <a16:creationId xmlns:a16="http://schemas.microsoft.com/office/drawing/2014/main" xmlns="" id="{2AB034E0-008F-43F5-8BAB-A81D72627EF6}"/>
               </a:ext>
             </a:extLst>
           </p:cNvPr>
@@ -28055,7 +28036,7 @@
           <p:cNvPr id="5" name="Graphic 4" descr="Server">
             <a:extLst>
               <a:ext uri="{FF2B5EF4-FFF2-40B4-BE49-F238E27FC236}">
-                <a16:creationId xmlns="" xmlns:a16="http://schemas.microsoft.com/office/drawing/2014/main" id="{A32AAC74-25F2-4434-9FCF-DCFC62730DBA}"/>
+                <a16:creationId xmlns:a16="http://schemas.microsoft.com/office/drawing/2014/main" xmlns="" id="{A32AAC74-25F2-4434-9FCF-DCFC62730DBA}"/>
               </a:ext>
             </a:extLst>
           </p:cNvPr>
@@ -28068,7 +28049,7 @@
           <a:blip r:embed="rId2">
             <a:extLst>
               <a:ext uri="{96DAC541-7B7A-43D3-8B79-37D633B846F1}">
-                <asvg:svgBlip xmlns="" xmlns:asvg="http://schemas.microsoft.com/office/drawing/2016/SVG/main" r:embed="rId3"/>
+                <asvg:svgBlip xmlns:asvg="http://schemas.microsoft.com/office/drawing/2016/SVG/main" xmlns="" r:embed="rId3"/>
               </a:ext>
             </a:extLst>
           </a:blip>
@@ -28091,7 +28072,7 @@
           <p:cNvPr id="7" name="TextBox 6">
             <a:extLst>
               <a:ext uri="{FF2B5EF4-FFF2-40B4-BE49-F238E27FC236}">
-                <a16:creationId xmlns="" xmlns:a16="http://schemas.microsoft.com/office/drawing/2014/main" id="{B289FAAC-F250-4A5E-9920-20720CB2295B}"/>
+                <a16:creationId xmlns:a16="http://schemas.microsoft.com/office/drawing/2014/main" xmlns="" id="{B289FAAC-F250-4A5E-9920-20720CB2295B}"/>
               </a:ext>
             </a:extLst>
           </p:cNvPr>
@@ -28126,7 +28107,7 @@
           <p:cNvPr id="8" name="TextBox 7">
             <a:extLst>
               <a:ext uri="{FF2B5EF4-FFF2-40B4-BE49-F238E27FC236}">
-                <a16:creationId xmlns="" xmlns:a16="http://schemas.microsoft.com/office/drawing/2014/main" id="{0AABBF9C-6084-469B-8960-30BA35207122}"/>
+                <a16:creationId xmlns:a16="http://schemas.microsoft.com/office/drawing/2014/main" xmlns="" id="{0AABBF9C-6084-469B-8960-30BA35207122}"/>
               </a:ext>
             </a:extLst>
           </p:cNvPr>
@@ -28161,7 +28142,7 @@
           <p:cNvPr id="10" name="Graphic 9" descr="Group of people">
             <a:extLst>
               <a:ext uri="{FF2B5EF4-FFF2-40B4-BE49-F238E27FC236}">
-                <a16:creationId xmlns="" xmlns:a16="http://schemas.microsoft.com/office/drawing/2014/main" id="{E8D320BA-F6AD-456B-A3F0-884F4952F413}"/>
+                <a16:creationId xmlns:a16="http://schemas.microsoft.com/office/drawing/2014/main" xmlns="" id="{E8D320BA-F6AD-456B-A3F0-884F4952F413}"/>
               </a:ext>
             </a:extLst>
           </p:cNvPr>
@@ -28174,7 +28155,7 @@
           <a:blip r:embed="rId4">
             <a:extLst>
               <a:ext uri="{96DAC541-7B7A-43D3-8B79-37D633B846F1}">
-                <asvg:svgBlip xmlns="" xmlns:asvg="http://schemas.microsoft.com/office/drawing/2016/SVG/main" r:embed="rId5"/>
+                <asvg:svgBlip xmlns:asvg="http://schemas.microsoft.com/office/drawing/2016/SVG/main" xmlns="" r:embed="rId5"/>
               </a:ext>
             </a:extLst>
           </a:blip>
@@ -28197,7 +28178,7 @@
           <p:cNvPr id="11" name="TextBox 10">
             <a:extLst>
               <a:ext uri="{FF2B5EF4-FFF2-40B4-BE49-F238E27FC236}">
-                <a16:creationId xmlns="" xmlns:a16="http://schemas.microsoft.com/office/drawing/2014/main" id="{633CD682-1973-4AEE-8062-378385BE6AB4}"/>
+                <a16:creationId xmlns:a16="http://schemas.microsoft.com/office/drawing/2014/main" xmlns="" id="{633CD682-1973-4AEE-8062-378385BE6AB4}"/>
               </a:ext>
             </a:extLst>
           </p:cNvPr>
@@ -28248,7 +28229,7 @@
           <p:cNvPr id="12" name="TextBox 11">
             <a:extLst>
               <a:ext uri="{FF2B5EF4-FFF2-40B4-BE49-F238E27FC236}">
-                <a16:creationId xmlns="" xmlns:a16="http://schemas.microsoft.com/office/drawing/2014/main" id="{970761D1-05D5-465D-994E-61A2C6C68A42}"/>
+                <a16:creationId xmlns:a16="http://schemas.microsoft.com/office/drawing/2014/main" xmlns="" id="{970761D1-05D5-465D-994E-61A2C6C68A42}"/>
               </a:ext>
             </a:extLst>
           </p:cNvPr>
@@ -28283,7 +28264,7 @@
           <p:cNvPr id="15" name="Picture 14">
             <a:extLst>
               <a:ext uri="{FF2B5EF4-FFF2-40B4-BE49-F238E27FC236}">
-                <a16:creationId xmlns="" xmlns:a16="http://schemas.microsoft.com/office/drawing/2014/main" id="{291427C6-B6A8-424E-98FE-F3D9F5BAA9FB}"/>
+                <a16:creationId xmlns:a16="http://schemas.microsoft.com/office/drawing/2014/main" xmlns="" id="{291427C6-B6A8-424E-98FE-F3D9F5BAA9FB}"/>
               </a:ext>
             </a:extLst>
           </p:cNvPr>

</xml_diff>